<commit_message>
Actualizo ppts 4 y 5
</commit_message>
<xml_diff>
--- a/clase4/teorica_4.pptx
+++ b/clase4/teorica_4.pptx
@@ -9333,8 +9333,8 @@
           </a:p>
         </p:txBody>
       </p:sp>
-      <mc:AlternateContent xmlns:mc="http://schemas.openxmlformats.org/markup-compatibility/2006">
-        <mc:Choice xmlns:a14="http://schemas.microsoft.com/office/drawing/2010/main" Requires="a14">
+      <mc:AlternateContent xmlns:mc="http://schemas.openxmlformats.org/markup-compatibility/2006" xmlns:a14="http://schemas.microsoft.com/office/drawing/2010/main">
+        <mc:Choice Requires="a14">
           <p:sp>
             <p:nvSpPr>
               <p:cNvPr id="6" name="Google Shape;182;p31">
@@ -10008,7 +10008,7 @@
             </p:txBody>
           </p:sp>
         </mc:Choice>
-        <mc:Fallback>
+        <mc:Fallback xmlns="">
           <p:sp>
             <p:nvSpPr>
               <p:cNvPr id="6" name="Google Shape;182;p31">
@@ -10207,8 +10207,8 @@
           <a:chExt cx="0" cy="0"/>
         </a:xfrm>
       </p:grpSpPr>
-      <mc:AlternateContent xmlns:mc="http://schemas.openxmlformats.org/markup-compatibility/2006">
-        <mc:Choice xmlns:a14="http://schemas.microsoft.com/office/drawing/2010/main" Requires="a14">
+      <mc:AlternateContent xmlns:mc="http://schemas.openxmlformats.org/markup-compatibility/2006" xmlns:a14="http://schemas.microsoft.com/office/drawing/2010/main">
+        <mc:Choice Requires="a14">
           <p:sp>
             <p:nvSpPr>
               <p:cNvPr id="6" name="Google Shape;182;p31">
@@ -11173,7 +11173,7 @@
             </p:txBody>
           </p:sp>
         </mc:Choice>
-        <mc:Fallback>
+        <mc:Fallback xmlns="">
           <p:sp>
             <p:nvSpPr>
               <p:cNvPr id="6" name="Google Shape;182;p31">
@@ -11220,8 +11220,8 @@
           </p:sp>
         </mc:Fallback>
       </mc:AlternateContent>
-      <mc:AlternateContent xmlns:mc="http://schemas.openxmlformats.org/markup-compatibility/2006">
-        <mc:Choice xmlns:a14="http://schemas.microsoft.com/office/drawing/2010/main" Requires="a14">
+      <mc:AlternateContent xmlns:mc="http://schemas.openxmlformats.org/markup-compatibility/2006" xmlns:a14="http://schemas.microsoft.com/office/drawing/2010/main">
+        <mc:Choice Requires="a14">
           <p:sp>
             <p:nvSpPr>
               <p:cNvPr id="8" name="CuadroTexto 7">
@@ -11503,7 +11503,7 @@
             </p:txBody>
           </p:sp>
         </mc:Choice>
-        <mc:Fallback>
+        <mc:Fallback xmlns="">
           <p:sp>
             <p:nvSpPr>
               <p:cNvPr id="8" name="CuadroTexto 7">
@@ -12605,8 +12605,8 @@
           <a:chExt cx="0" cy="0"/>
         </a:xfrm>
       </p:grpSpPr>
-      <mc:AlternateContent xmlns:mc="http://schemas.openxmlformats.org/markup-compatibility/2006">
-        <mc:Choice xmlns:a14="http://schemas.microsoft.com/office/drawing/2010/main" Requires="a14">
+      <mc:AlternateContent xmlns:mc="http://schemas.openxmlformats.org/markup-compatibility/2006" xmlns:a14="http://schemas.microsoft.com/office/drawing/2010/main">
+        <mc:Choice Requires="a14">
           <p:graphicFrame>
             <p:nvGraphicFramePr>
               <p:cNvPr id="6" name="Tabla 6">
@@ -13673,7 +13673,7 @@
             </a:graphic>
           </p:graphicFrame>
         </mc:Choice>
-        <mc:Fallback>
+        <mc:Fallback xmlns="">
           <p:graphicFrame>
             <p:nvGraphicFramePr>
               <p:cNvPr id="6" name="Tabla 6">
@@ -14329,8 +14329,8 @@
           </p:graphicFrame>
         </mc:Fallback>
       </mc:AlternateContent>
-      <mc:AlternateContent xmlns:mc="http://schemas.openxmlformats.org/markup-compatibility/2006">
-        <mc:Choice xmlns:a14="http://schemas.microsoft.com/office/drawing/2010/main" Requires="a14">
+      <mc:AlternateContent xmlns:mc="http://schemas.openxmlformats.org/markup-compatibility/2006" xmlns:a14="http://schemas.microsoft.com/office/drawing/2010/main">
+        <mc:Choice Requires="a14">
           <p:sp>
             <p:nvSpPr>
               <p:cNvPr id="2" name="CuadroTexto 1">
@@ -14404,7 +14404,7 @@
             </p:txBody>
           </p:sp>
         </mc:Choice>
-        <mc:Fallback>
+        <mc:Fallback xmlns="">
           <p:sp>
             <p:nvSpPr>
               <p:cNvPr id="2" name="CuadroTexto 1">
@@ -14452,8 +14452,8 @@
           </p:sp>
         </mc:Fallback>
       </mc:AlternateContent>
-      <mc:AlternateContent xmlns:mc="http://schemas.openxmlformats.org/markup-compatibility/2006">
-        <mc:Choice xmlns:a14="http://schemas.microsoft.com/office/drawing/2010/main" Requires="a14">
+      <mc:AlternateContent xmlns:mc="http://schemas.openxmlformats.org/markup-compatibility/2006" xmlns:a14="http://schemas.microsoft.com/office/drawing/2010/main">
+        <mc:Choice Requires="a14">
           <p:sp>
             <p:nvSpPr>
               <p:cNvPr id="4" name="CuadroTexto 3">
@@ -14527,7 +14527,7 @@
             </p:txBody>
           </p:sp>
         </mc:Choice>
-        <mc:Fallback>
+        <mc:Fallback xmlns="">
           <p:sp>
             <p:nvSpPr>
               <p:cNvPr id="4" name="CuadroTexto 3">
@@ -14575,8 +14575,8 @@
           </p:sp>
         </mc:Fallback>
       </mc:AlternateContent>
-      <mc:AlternateContent xmlns:mc="http://schemas.openxmlformats.org/markup-compatibility/2006">
-        <mc:Choice xmlns:a14="http://schemas.microsoft.com/office/drawing/2010/main" Requires="a14">
+      <mc:AlternateContent xmlns:mc="http://schemas.openxmlformats.org/markup-compatibility/2006" xmlns:a14="http://schemas.microsoft.com/office/drawing/2010/main">
+        <mc:Choice Requires="a14">
           <p:sp>
             <p:nvSpPr>
               <p:cNvPr id="5" name="CuadroTexto 4">
@@ -14650,7 +14650,7 @@
             </p:txBody>
           </p:sp>
         </mc:Choice>
-        <mc:Fallback>
+        <mc:Fallback xmlns="">
           <p:sp>
             <p:nvSpPr>
               <p:cNvPr id="5" name="CuadroTexto 4">
@@ -19405,8 +19405,8 @@
           </a:p>
         </p:txBody>
       </p:sp>
-      <mc:AlternateContent xmlns:mc="http://schemas.openxmlformats.org/markup-compatibility/2006">
-        <mc:Choice xmlns:a14="http://schemas.microsoft.com/office/drawing/2010/main" Requires="a14">
+      <mc:AlternateContent xmlns:mc="http://schemas.openxmlformats.org/markup-compatibility/2006" xmlns:a14="http://schemas.microsoft.com/office/drawing/2010/main">
+        <mc:Choice Requires="a14">
           <p:sp>
             <p:nvSpPr>
               <p:cNvPr id="2" name="CuadroTexto 1">
@@ -19830,7 +19830,7 @@
             </p:txBody>
           </p:sp>
         </mc:Choice>
-        <mc:Fallback>
+        <mc:Fallback xmlns="">
           <p:sp>
             <p:nvSpPr>
               <p:cNvPr id="2" name="CuadroTexto 1">
@@ -22275,8 +22275,8 @@
         </p:nvSpPr>
         <p:spPr>
           <a:xfrm>
-            <a:off x="127589" y="320038"/>
-            <a:ext cx="5897527" cy="4524315"/>
+            <a:off x="127590" y="320038"/>
+            <a:ext cx="5432952" cy="4524315"/>
           </a:xfrm>
           <a:prstGeom prst="rect">
             <a:avLst/>
@@ -22312,7 +22312,7 @@
             </a:endParaRPr>
           </a:p>
           <a:p>
-            <a:pPr marL="177800" indent="-177800" algn="l">
+            <a:pPr marL="177800" indent="-177800" algn="just">
               <a:buClr>
                 <a:schemeClr val="accent2"/>
               </a:buClr>
@@ -22354,7 +22354,7 @@
             </a:r>
           </a:p>
           <a:p>
-            <a:pPr marL="177800" indent="-177800" algn="ctr">
+            <a:pPr marL="177800" indent="-177800" algn="just">
               <a:buClr>
                 <a:schemeClr val="accent2"/>
               </a:buClr>
@@ -22370,7 +22370,7 @@
             </a:endParaRPr>
           </a:p>
           <a:p>
-            <a:pPr marL="177800" indent="-177800" algn="l">
+            <a:pPr marL="177800" indent="-177800" algn="just">
               <a:buClr>
                 <a:schemeClr val="accent2"/>
               </a:buClr>
@@ -22428,7 +22428,7 @@
             </a:endParaRPr>
           </a:p>
           <a:p>
-            <a:pPr marL="177800" indent="-177800" algn="l">
+            <a:pPr marL="177800" indent="-177800" algn="just">
               <a:buClr>
                 <a:schemeClr val="accent2"/>
               </a:buClr>
@@ -22765,8 +22765,8 @@
           </a:p>
         </p:txBody>
       </p:sp>
-      <mc:AlternateContent xmlns:mc="http://schemas.openxmlformats.org/markup-compatibility/2006">
-        <mc:Choice xmlns:a14="http://schemas.microsoft.com/office/drawing/2010/main" Requires="a14">
+      <mc:AlternateContent xmlns:mc="http://schemas.openxmlformats.org/markup-compatibility/2006" xmlns:a14="http://schemas.microsoft.com/office/drawing/2010/main">
+        <mc:Choice Requires="a14">
           <p:sp>
             <p:nvSpPr>
               <p:cNvPr id="6" name="Google Shape;182;p31">
@@ -23017,7 +23017,7 @@
             </p:txBody>
           </p:sp>
         </mc:Choice>
-        <mc:Fallback>
+        <mc:Fallback xmlns="">
           <p:sp>
             <p:nvSpPr>
               <p:cNvPr id="6" name="Google Shape;182;p31">
@@ -23202,8 +23202,8 @@
           </a:p>
         </p:txBody>
       </p:sp>
-      <mc:AlternateContent xmlns:mc="http://schemas.openxmlformats.org/markup-compatibility/2006">
-        <mc:Choice xmlns:a14="http://schemas.microsoft.com/office/drawing/2010/main" Requires="a14">
+      <mc:AlternateContent xmlns:mc="http://schemas.openxmlformats.org/markup-compatibility/2006" xmlns:a14="http://schemas.microsoft.com/office/drawing/2010/main">
+        <mc:Choice Requires="a14">
           <p:sp>
             <p:nvSpPr>
               <p:cNvPr id="6" name="Google Shape;182;p31">
@@ -23525,7 +23525,7 @@
             </p:txBody>
           </p:sp>
         </mc:Choice>
-        <mc:Fallback>
+        <mc:Fallback xmlns="">
           <p:sp>
             <p:nvSpPr>
               <p:cNvPr id="6" name="Google Shape;182;p31">

</xml_diff>